<commit_message>
plan de la soutenance de thèse
</commit_message>
<xml_diff>
--- a/Plan de soutenance These Morton Silun.pptx
+++ b/Plan de soutenance These Morton Silun.pptx
@@ -6,7 +6,10 @@
   </p:sldMasterIdLst>
   <p:sldIdLst>
     <p:sldId id="256" r:id="rId2"/>
-    <p:sldId id="257" r:id="rId3"/>
+    <p:sldId id="258" r:id="rId3"/>
+    <p:sldId id="259" r:id="rId4"/>
+    <p:sldId id="260" r:id="rId5"/>
+    <p:sldId id="261" r:id="rId6"/>
   </p:sldIdLst>
   <p:sldSz cx="12192000" cy="6858000"/>
   <p:notesSz cx="6858000" cy="9144000"/>
@@ -105,6 +108,11 @@
       </a:defRPr>
     </a:lvl9pPr>
   </p:defaultTextStyle>
+  <p:extLst>
+    <p:ext uri="{EFAFB233-063F-42B5-8137-9DF3F51BA10A}">
+      <p15:sldGuideLst xmlns:p15="http://schemas.microsoft.com/office/powerpoint/2012/main"/>
+    </p:ext>
+  </p:extLst>
 </p:presentation>
 </file>
 
@@ -2973,7 +2981,7 @@
         </p:nvSpPr>
         <p:spPr>
           <a:xfrm>
-            <a:off x="1345913" y="893851"/>
+            <a:off x="924673" y="2095928"/>
             <a:ext cx="10243335" cy="1569660"/>
           </a:xfrm>
           <a:prstGeom prst="rect">
@@ -3049,8 +3057,8 @@
         </p:nvSpPr>
         <p:spPr>
           <a:xfrm>
-            <a:off x="945221" y="523981"/>
-            <a:ext cx="10243335" cy="6001643"/>
+            <a:off x="1017140" y="780834"/>
+            <a:ext cx="10243335" cy="4893647"/>
           </a:xfrm>
           <a:prstGeom prst="rect">
             <a:avLst/>
@@ -3065,7 +3073,15 @@
           <a:p>
             <a:r>
               <a:rPr lang="fr-FR" sz="2400" dirty="0" smtClean="0"/>
-              <a:t>Plan de soutenance :</a:t>
+              <a:t>Plan</a:t>
+            </a:r>
+            <a:r>
+              <a:rPr lang="fr-FR" sz="2400" dirty="0" smtClean="0"/>
+              <a:t> </a:t>
+            </a:r>
+            <a:r>
+              <a:rPr lang="fr-FR" sz="2400" dirty="0" smtClean="0"/>
+              <a:t>de soutenance :</a:t>
             </a:r>
           </a:p>
           <a:p>
@@ -3077,9 +3093,10 @@
               <a:buChar char="•"/>
             </a:pPr>
             <a:r>
-              <a:rPr lang="fr-FR" sz="2400" dirty="0" smtClean="0"/>
-              <a:t>Contexte de thèse</a:t>
-            </a:r>
+              <a:rPr lang="fr-FR" sz="2400" b="1" dirty="0" smtClean="0"/>
+              <a:t>Contexte</a:t>
+            </a:r>
+            <a:endParaRPr lang="fr-FR" sz="2400" b="1" dirty="0" smtClean="0"/>
           </a:p>
           <a:p>
             <a:endParaRPr lang="fr-FR" sz="2400" dirty="0" smtClean="0"/>
@@ -3090,9 +3107,22 @@
               <a:buChar char="•"/>
             </a:pPr>
             <a:r>
-              <a:rPr lang="fr-FR" sz="2400" dirty="0" smtClean="0"/>
-              <a:t>Bibliographie – Stratégie de modélisation numériques (modulable)</a:t>
-            </a:r>
+              <a:rPr lang="fr-FR" sz="2400" b="1" dirty="0" smtClean="0"/>
+              <a:t>Bibliographie – </a:t>
+            </a:r>
+            <a:r>
+              <a:rPr lang="fr-FR" sz="2400" b="1" dirty="0"/>
+              <a:t>Stratégie modulable </a:t>
+            </a:r>
+            <a:r>
+              <a:rPr lang="fr-FR" sz="2400" b="1" dirty="0" smtClean="0"/>
+              <a:t>de modélisation </a:t>
+            </a:r>
+            <a:r>
+              <a:rPr lang="fr-FR" sz="2400" b="1" dirty="0" smtClean="0"/>
+              <a:t>numériques</a:t>
+            </a:r>
+            <a:endParaRPr lang="fr-FR" sz="2400" b="1" dirty="0" smtClean="0"/>
           </a:p>
           <a:p>
             <a:endParaRPr lang="fr-FR" sz="2400" dirty="0" smtClean="0"/>
@@ -3103,12 +3133,13 @@
               <a:buChar char="•"/>
             </a:pPr>
             <a:r>
-              <a:rPr lang="fr-FR" sz="2400" dirty="0" smtClean="0"/>
-              <a:t>Présentation des chaque modules dans le modèle robuste de l’effet Morton</a:t>
-            </a:r>
-          </a:p>
-          <a:p>
-            <a:endParaRPr lang="fr-FR" sz="2400" dirty="0" smtClean="0"/>
+              <a:rPr lang="fr-FR" sz="2400" b="1" dirty="0" smtClean="0"/>
+              <a:t>Modèle de l’effet Morton et sa validation </a:t>
+            </a:r>
+            <a:endParaRPr lang="fr-FR" sz="2400" b="1" dirty="0" smtClean="0"/>
+          </a:p>
+          <a:p>
+            <a:endParaRPr lang="fr-FR" sz="2400" dirty="0"/>
           </a:p>
           <a:p>
             <a:pPr marL="342900" indent="-342900">
@@ -3116,8 +3147,12 @@
               <a:buChar char="•"/>
             </a:pPr>
             <a:r>
-              <a:rPr lang="fr-FR" sz="2400" dirty="0" smtClean="0"/>
-              <a:t>Couplage des sous modules du modèle de l’effet Morton</a:t>
+              <a:rPr lang="fr-FR" sz="2400" b="1" dirty="0" smtClean="0"/>
+              <a:t>Analyse de la stabilité de l’effet </a:t>
+            </a:r>
+            <a:r>
+              <a:rPr lang="fr-FR" sz="2400" b="1" dirty="0" smtClean="0"/>
+              <a:t>Morton</a:t>
             </a:r>
           </a:p>
           <a:p>
@@ -3125,25 +3160,6 @@
               <a:buFont typeface="Arial" panose="020B0604020202020204" pitchFamily="34" charset="0"/>
               <a:buChar char="•"/>
             </a:pPr>
-            <a:r>
-              <a:rPr lang="fr-FR" sz="2400" dirty="0" smtClean="0"/>
-              <a:t>Validation du modèle – confrontation </a:t>
-            </a:r>
-            <a:r>
-              <a:rPr lang="fr-FR" sz="2400" dirty="0" err="1" smtClean="0"/>
-              <a:t>num</a:t>
-            </a:r>
-            <a:r>
-              <a:rPr lang="fr-FR" sz="2400" dirty="0" smtClean="0"/>
-              <a:t>/</a:t>
-            </a:r>
-            <a:r>
-              <a:rPr lang="fr-FR" sz="2400" dirty="0" err="1" smtClean="0"/>
-              <a:t>exp</a:t>
-            </a:r>
-            <a:endParaRPr lang="fr-FR" sz="2400" dirty="0" smtClean="0"/>
-          </a:p>
-          <a:p>
             <a:endParaRPr lang="fr-FR" sz="2400" dirty="0"/>
           </a:p>
           <a:p>
@@ -3152,12 +3168,13 @@
               <a:buChar char="•"/>
             </a:pPr>
             <a:r>
-              <a:rPr lang="fr-FR" sz="2400" dirty="0" smtClean="0"/>
-              <a:t>Analyse de la stabilité de l’effet Morton</a:t>
-            </a:r>
-          </a:p>
-          <a:p>
-            <a:endParaRPr lang="fr-FR" sz="2400" dirty="0"/>
+              <a:rPr lang="fr-FR" sz="2400" b="1" dirty="0" smtClean="0"/>
+              <a:t>Mise en évidence de l’effet Morton (rotor flexible)</a:t>
+            </a:r>
+            <a:endParaRPr lang="fr-FR" sz="2400" b="1" dirty="0" smtClean="0"/>
+          </a:p>
+          <a:p>
+            <a:endParaRPr lang="fr-FR" sz="2400" dirty="0" smtClean="0"/>
           </a:p>
           <a:p>
             <a:pPr marL="342900" indent="-342900">
@@ -3165,29 +3182,373 @@
               <a:buChar char="•"/>
             </a:pPr>
             <a:r>
-              <a:rPr lang="fr-FR" sz="2400" dirty="0" smtClean="0"/>
-              <a:t>Simulation de l’effet Morton sur le rotor flexible</a:t>
-            </a:r>
-          </a:p>
-          <a:p>
-            <a:endParaRPr lang="fr-FR" sz="2400" dirty="0" smtClean="0"/>
-          </a:p>
-          <a:p>
-            <a:pPr marL="342900" indent="-342900">
+              <a:rPr lang="fr-FR" sz="2400" b="1" dirty="0" smtClean="0"/>
+              <a:t>Conclusion/</a:t>
+            </a:r>
+            <a:r>
+              <a:rPr lang="fr-FR" sz="2400" b="1" dirty="0" err="1" smtClean="0"/>
+              <a:t>persepctives</a:t>
+            </a:r>
+            <a:r>
+              <a:rPr lang="fr-FR" sz="2400" b="1" dirty="0" smtClean="0"/>
+              <a:t>/contribution des travaux</a:t>
+            </a:r>
+          </a:p>
+        </p:txBody>
+      </p:sp>
+    </p:spTree>
+    <p:extLst>
+      <p:ext uri="{BB962C8B-B14F-4D97-AF65-F5344CB8AC3E}">
+        <p14:creationId xmlns:p14="http://schemas.microsoft.com/office/powerpoint/2010/main" val="3423347121"/>
+      </p:ext>
+    </p:extLst>
+  </p:cSld>
+  <p:clrMapOvr>
+    <a:masterClrMapping/>
+  </p:clrMapOvr>
+</p:sld>
+</file>
+
+<file path=ppt/slides/slide3.xml><?xml version="1.0" encoding="utf-8"?>
+<p:sld xmlns:a="http://schemas.openxmlformats.org/drawingml/2006/main" xmlns:r="http://schemas.openxmlformats.org/officeDocument/2006/relationships" xmlns:p="http://schemas.openxmlformats.org/presentationml/2006/main">
+  <p:cSld>
+    <p:spTree>
+      <p:nvGrpSpPr>
+        <p:cNvPr id="1" name=""/>
+        <p:cNvGrpSpPr/>
+        <p:nvPr/>
+      </p:nvGrpSpPr>
+      <p:grpSpPr>
+        <a:xfrm>
+          <a:off x="0" y="0"/>
+          <a:ext cx="0" cy="0"/>
+          <a:chOff x="0" y="0"/>
+          <a:chExt cx="0" cy="0"/>
+        </a:xfrm>
+      </p:grpSpPr>
+      <p:sp>
+        <p:nvSpPr>
+          <p:cNvPr id="4" name="Rectangle 3"/>
+          <p:cNvSpPr/>
+          <p:nvPr/>
+        </p:nvSpPr>
+        <p:spPr>
+          <a:xfrm>
+            <a:off x="632705" y="429215"/>
+            <a:ext cx="2170915" cy="400110"/>
+          </a:xfrm>
+          <a:prstGeom prst="rect">
+            <a:avLst/>
+          </a:prstGeom>
+        </p:spPr>
+        <p:txBody>
+          <a:bodyPr wrap="none">
+            <a:spAutoFit/>
+          </a:bodyPr>
+          <a:lstStyle/>
+          <a:p>
+            <a:r>
+              <a:rPr lang="fr-FR" sz="2000" b="1" dirty="0" smtClean="0"/>
+              <a:t>Contexte ( 5 </a:t>
+            </a:r>
+            <a:r>
+              <a:rPr lang="fr-FR" sz="2000" b="1" dirty="0" err="1" smtClean="0"/>
+              <a:t>mins</a:t>
+            </a:r>
+            <a:r>
+              <a:rPr lang="fr-FR" sz="2000" b="1" dirty="0" smtClean="0"/>
+              <a:t> )</a:t>
+            </a:r>
+          </a:p>
+        </p:txBody>
+      </p:sp>
+      <p:sp>
+        <p:nvSpPr>
+          <p:cNvPr id="5" name="ZoneTexte 4"/>
+          <p:cNvSpPr txBox="1"/>
+          <p:nvPr/>
+        </p:nvSpPr>
+        <p:spPr>
+          <a:xfrm>
+            <a:off x="1109610" y="1775114"/>
+            <a:ext cx="3636188" cy="369332"/>
+          </a:xfrm>
+          <a:prstGeom prst="rect">
+            <a:avLst/>
+          </a:prstGeom>
+          <a:noFill/>
+        </p:spPr>
+        <p:txBody>
+          <a:bodyPr wrap="none" rtlCol="0">
+            <a:spAutoFit/>
+          </a:bodyPr>
+          <a:lstStyle/>
+          <a:p>
+            <a:pPr marL="285750" indent="-285750">
               <a:buFont typeface="Arial" panose="020B0604020202020204" pitchFamily="34" charset="0"/>
               <a:buChar char="•"/>
             </a:pPr>
             <a:r>
-              <a:rPr lang="fr-FR" sz="2400" dirty="0" smtClean="0"/>
-              <a:t>Conclusion/</a:t>
-            </a:r>
-            <a:r>
-              <a:rPr lang="fr-FR" sz="2400" dirty="0" err="1" smtClean="0"/>
-              <a:t>persepctives</a:t>
-            </a:r>
-            <a:r>
-              <a:rPr lang="fr-FR" sz="2400" dirty="0" smtClean="0"/>
-              <a:t>/contribution des travaux</a:t>
+              <a:rPr lang="fr-FR" dirty="0" smtClean="0"/>
+              <a:t>Contexte scientifique et industriel</a:t>
+            </a:r>
+          </a:p>
+        </p:txBody>
+      </p:sp>
+      <p:sp>
+        <p:nvSpPr>
+          <p:cNvPr id="6" name="ZoneTexte 5"/>
+          <p:cNvSpPr txBox="1"/>
+          <p:nvPr/>
+        </p:nvSpPr>
+        <p:spPr>
+          <a:xfrm>
+            <a:off x="1109610" y="2144446"/>
+            <a:ext cx="2530821" cy="369332"/>
+          </a:xfrm>
+          <a:prstGeom prst="rect">
+            <a:avLst/>
+          </a:prstGeom>
+          <a:noFill/>
+        </p:spPr>
+        <p:txBody>
+          <a:bodyPr wrap="none" rtlCol="0">
+            <a:spAutoFit/>
+          </a:bodyPr>
+          <a:lstStyle/>
+          <a:p>
+            <a:pPr marL="285750" indent="-285750">
+              <a:buFont typeface="Arial" panose="020B0604020202020204" pitchFamily="34" charset="0"/>
+              <a:buChar char="•"/>
+            </a:pPr>
+            <a:r>
+              <a:rPr lang="fr-FR" dirty="0" smtClean="0"/>
+              <a:t>Objectives de la thèse</a:t>
+            </a:r>
+            <a:endParaRPr lang="fr-FR" dirty="0"/>
+          </a:p>
+        </p:txBody>
+      </p:sp>
+      <p:sp>
+        <p:nvSpPr>
+          <p:cNvPr id="8" name="Rectangle 7"/>
+          <p:cNvSpPr/>
+          <p:nvPr/>
+        </p:nvSpPr>
+        <p:spPr>
+          <a:xfrm>
+            <a:off x="632705" y="2740900"/>
+            <a:ext cx="5211170" cy="369332"/>
+          </a:xfrm>
+          <a:prstGeom prst="rect">
+            <a:avLst/>
+          </a:prstGeom>
+        </p:spPr>
+        <p:txBody>
+          <a:bodyPr wrap="none">
+            <a:spAutoFit/>
+          </a:bodyPr>
+          <a:lstStyle/>
+          <a:p>
+            <a:r>
+              <a:rPr lang="fr-FR" b="1" dirty="0" smtClean="0"/>
+              <a:t>Bibliographie – stratégie de modélisation </a:t>
+            </a:r>
+            <a:r>
+              <a:rPr lang="fr-FR" b="1" dirty="0"/>
+              <a:t>( </a:t>
+            </a:r>
+            <a:r>
+              <a:rPr lang="fr-FR" b="1" dirty="0" smtClean="0"/>
+              <a:t>5 </a:t>
+            </a:r>
+            <a:r>
+              <a:rPr lang="fr-FR" b="1" dirty="0" err="1"/>
+              <a:t>mins</a:t>
+            </a:r>
+            <a:r>
+              <a:rPr lang="fr-FR" b="1" dirty="0"/>
+              <a:t> </a:t>
+            </a:r>
+            <a:r>
+              <a:rPr lang="fr-FR" b="1" dirty="0" smtClean="0"/>
+              <a:t>)</a:t>
+            </a:r>
+            <a:endParaRPr lang="fr-FR" b="1" dirty="0"/>
+          </a:p>
+        </p:txBody>
+      </p:sp>
+      <p:sp>
+        <p:nvSpPr>
+          <p:cNvPr id="9" name="ZoneTexte 8"/>
+          <p:cNvSpPr txBox="1"/>
+          <p:nvPr/>
+        </p:nvSpPr>
+        <p:spPr>
+          <a:xfrm>
+            <a:off x="1109610" y="3335995"/>
+            <a:ext cx="3221651" cy="369332"/>
+          </a:xfrm>
+          <a:prstGeom prst="rect">
+            <a:avLst/>
+          </a:prstGeom>
+          <a:noFill/>
+        </p:spPr>
+        <p:txBody>
+          <a:bodyPr wrap="none" rtlCol="0">
+            <a:spAutoFit/>
+          </a:bodyPr>
+          <a:lstStyle/>
+          <a:p>
+            <a:pPr marL="285750" indent="-285750">
+              <a:buFont typeface="Arial" panose="020B0604020202020204" pitchFamily="34" charset="0"/>
+              <a:buChar char="•"/>
+            </a:pPr>
+            <a:r>
+              <a:rPr lang="fr-FR" dirty="0" smtClean="0"/>
+              <a:t>Effet Newkirk et Effet Morton</a:t>
+            </a:r>
+          </a:p>
+        </p:txBody>
+      </p:sp>
+      <p:sp>
+        <p:nvSpPr>
+          <p:cNvPr id="10" name="ZoneTexte 9"/>
+          <p:cNvSpPr txBox="1"/>
+          <p:nvPr/>
+        </p:nvSpPr>
+        <p:spPr>
+          <a:xfrm>
+            <a:off x="1109610" y="1405782"/>
+            <a:ext cx="3794437" cy="369332"/>
+          </a:xfrm>
+          <a:prstGeom prst="rect">
+            <a:avLst/>
+          </a:prstGeom>
+          <a:noFill/>
+        </p:spPr>
+        <p:txBody>
+          <a:bodyPr wrap="none" rtlCol="0">
+            <a:spAutoFit/>
+          </a:bodyPr>
+          <a:lstStyle/>
+          <a:p>
+            <a:pPr marL="285750" indent="-285750">
+              <a:buFont typeface="Arial" panose="020B0604020202020204" pitchFamily="34" charset="0"/>
+              <a:buChar char="•"/>
+            </a:pPr>
+            <a:r>
+              <a:rPr lang="fr-FR" dirty="0" smtClean="0"/>
+              <a:t>Définition concise de l’effet Morton</a:t>
+            </a:r>
+            <a:endParaRPr lang="fr-FR" dirty="0"/>
+          </a:p>
+        </p:txBody>
+      </p:sp>
+      <p:sp>
+        <p:nvSpPr>
+          <p:cNvPr id="11" name="ZoneTexte 10"/>
+          <p:cNvSpPr txBox="1"/>
+          <p:nvPr/>
+        </p:nvSpPr>
+        <p:spPr>
+          <a:xfrm>
+            <a:off x="1109609" y="1036450"/>
+            <a:ext cx="5921878" cy="369332"/>
+          </a:xfrm>
+          <a:prstGeom prst="rect">
+            <a:avLst/>
+          </a:prstGeom>
+          <a:noFill/>
+        </p:spPr>
+        <p:txBody>
+          <a:bodyPr wrap="none" rtlCol="0">
+            <a:spAutoFit/>
+          </a:bodyPr>
+          <a:lstStyle/>
+          <a:p>
+            <a:pPr marL="285750" indent="-285750">
+              <a:buFont typeface="Arial" panose="020B0604020202020204" pitchFamily="34" charset="0"/>
+              <a:buChar char="•"/>
+            </a:pPr>
+            <a:r>
+              <a:rPr lang="fr-FR" dirty="0" smtClean="0"/>
+              <a:t>Accroche par un cas industriel ( vibration spirale, </a:t>
+            </a:r>
+            <a:r>
+              <a:rPr lang="fr-FR" dirty="0" err="1" smtClean="0"/>
+              <a:t>hyéstésis</a:t>
+            </a:r>
+            <a:r>
+              <a:rPr lang="fr-FR" dirty="0" smtClean="0"/>
+              <a:t> </a:t>
+            </a:r>
+            <a:endParaRPr lang="fr-FR" dirty="0"/>
+          </a:p>
+        </p:txBody>
+      </p:sp>
+      <p:sp>
+        <p:nvSpPr>
+          <p:cNvPr id="12" name="ZoneTexte 11"/>
+          <p:cNvSpPr txBox="1"/>
+          <p:nvPr/>
+        </p:nvSpPr>
+        <p:spPr>
+          <a:xfrm>
+            <a:off x="1109610" y="3848896"/>
+            <a:ext cx="5779146" cy="369332"/>
+          </a:xfrm>
+          <a:prstGeom prst="rect">
+            <a:avLst/>
+          </a:prstGeom>
+          <a:noFill/>
+        </p:spPr>
+        <p:txBody>
+          <a:bodyPr wrap="none" rtlCol="0">
+            <a:spAutoFit/>
+          </a:bodyPr>
+          <a:lstStyle/>
+          <a:p>
+            <a:pPr marL="285750" indent="-285750">
+              <a:buFont typeface="Arial" panose="020B0604020202020204" pitchFamily="34" charset="0"/>
+              <a:buChar char="•"/>
+            </a:pPr>
+            <a:r>
+              <a:rPr lang="fr-FR" dirty="0" smtClean="0"/>
+              <a:t>Présentation concise sur les méthodes dans la littérature</a:t>
+            </a:r>
+          </a:p>
+        </p:txBody>
+      </p:sp>
+      <p:sp>
+        <p:nvSpPr>
+          <p:cNvPr id="13" name="ZoneTexte 12"/>
+          <p:cNvSpPr txBox="1"/>
+          <p:nvPr/>
+        </p:nvSpPr>
+        <p:spPr>
+          <a:xfrm>
+            <a:off x="1109609" y="4361797"/>
+            <a:ext cx="8763938" cy="646331"/>
+          </a:xfrm>
+          <a:prstGeom prst="rect">
+            <a:avLst/>
+          </a:prstGeom>
+          <a:noFill/>
+        </p:spPr>
+        <p:txBody>
+          <a:bodyPr wrap="square" rtlCol="0">
+            <a:spAutoFit/>
+          </a:bodyPr>
+          <a:lstStyle/>
+          <a:p>
+            <a:pPr marL="285750" indent="-285750">
+              <a:buFont typeface="Arial" panose="020B0604020202020204" pitchFamily="34" charset="0"/>
+              <a:buChar char="•"/>
+            </a:pPr>
+            <a:r>
+              <a:rPr lang="fr-FR" dirty="0" smtClean="0"/>
+              <a:t>Stratégie fixe pour modéliser l’effet Morton ( Modélisation modulable : module palier, module de la dynamique du rotor, module thermomécanique du rotor  )</a:t>
             </a:r>
           </a:p>
         </p:txBody>
@@ -3195,7 +3556,551 @@
     </p:spTree>
     <p:extLst>
       <p:ext uri="{BB962C8B-B14F-4D97-AF65-F5344CB8AC3E}">
-        <p14:creationId xmlns:p14="http://schemas.microsoft.com/office/powerpoint/2010/main" val="41234151"/>
+        <p14:creationId xmlns:p14="http://schemas.microsoft.com/office/powerpoint/2010/main" val="763402704"/>
+      </p:ext>
+    </p:extLst>
+  </p:cSld>
+  <p:clrMapOvr>
+    <a:masterClrMapping/>
+  </p:clrMapOvr>
+</p:sld>
+</file>
+
+<file path=ppt/slides/slide4.xml><?xml version="1.0" encoding="utf-8"?>
+<p:sld xmlns:a="http://schemas.openxmlformats.org/drawingml/2006/main" xmlns:r="http://schemas.openxmlformats.org/officeDocument/2006/relationships" xmlns:p="http://schemas.openxmlformats.org/presentationml/2006/main">
+  <p:cSld>
+    <p:spTree>
+      <p:nvGrpSpPr>
+        <p:cNvPr id="1" name=""/>
+        <p:cNvGrpSpPr/>
+        <p:nvPr/>
+      </p:nvGrpSpPr>
+      <p:grpSpPr>
+        <a:xfrm>
+          <a:off x="0" y="0"/>
+          <a:ext cx="0" cy="0"/>
+          <a:chOff x="0" y="0"/>
+          <a:chExt cx="0" cy="0"/>
+        </a:xfrm>
+      </p:grpSpPr>
+      <p:sp>
+        <p:nvSpPr>
+          <p:cNvPr id="4" name="Rectangle 3"/>
+          <p:cNvSpPr/>
+          <p:nvPr/>
+        </p:nvSpPr>
+        <p:spPr>
+          <a:xfrm>
+            <a:off x="632705" y="429215"/>
+            <a:ext cx="5774081" cy="400110"/>
+          </a:xfrm>
+          <a:prstGeom prst="rect">
+            <a:avLst/>
+          </a:prstGeom>
+        </p:spPr>
+        <p:txBody>
+          <a:bodyPr wrap="none">
+            <a:spAutoFit/>
+          </a:bodyPr>
+          <a:lstStyle/>
+          <a:p>
+            <a:r>
+              <a:rPr lang="fr-FR" sz="2000" b="1" dirty="0"/>
+              <a:t>Modèle de l’effet Morton et sa </a:t>
+            </a:r>
+            <a:r>
+              <a:rPr lang="fr-FR" sz="2000" b="1" dirty="0" smtClean="0"/>
+              <a:t>validation ( 25 </a:t>
+            </a:r>
+            <a:r>
+              <a:rPr lang="fr-FR" sz="2000" b="1" dirty="0" err="1" smtClean="0"/>
+              <a:t>mins</a:t>
+            </a:r>
+            <a:r>
+              <a:rPr lang="fr-FR" sz="2000" b="1" dirty="0" smtClean="0"/>
+              <a:t> ) </a:t>
+            </a:r>
+            <a:endParaRPr lang="fr-FR" sz="2000" b="1" dirty="0"/>
+          </a:p>
+        </p:txBody>
+      </p:sp>
+      <p:sp>
+        <p:nvSpPr>
+          <p:cNvPr id="11" name="ZoneTexte 10"/>
+          <p:cNvSpPr txBox="1"/>
+          <p:nvPr/>
+        </p:nvSpPr>
+        <p:spPr>
+          <a:xfrm>
+            <a:off x="1191802" y="1087820"/>
+            <a:ext cx="9174823" cy="5355312"/>
+          </a:xfrm>
+          <a:prstGeom prst="rect">
+            <a:avLst/>
+          </a:prstGeom>
+          <a:noFill/>
+        </p:spPr>
+        <p:txBody>
+          <a:bodyPr wrap="square" rtlCol="0">
+            <a:spAutoFit/>
+          </a:bodyPr>
+          <a:lstStyle/>
+          <a:p>
+            <a:pPr marL="285750" indent="-285750">
+              <a:buFont typeface="Arial" panose="020B0604020202020204" pitchFamily="34" charset="0"/>
+              <a:buChar char="•"/>
+            </a:pPr>
+            <a:r>
+              <a:rPr lang="fr-FR" dirty="0" smtClean="0"/>
+              <a:t>Module thermomécanique du rotor</a:t>
+            </a:r>
+          </a:p>
+          <a:p>
+            <a:pPr marL="742950" lvl="1" indent="-285750">
+              <a:buFontTx/>
+              <a:buChar char="-"/>
+            </a:pPr>
+            <a:r>
+              <a:rPr lang="fr-FR" dirty="0" smtClean="0"/>
+              <a:t>Modélisation du balourd thermique</a:t>
+            </a:r>
+          </a:p>
+          <a:p>
+            <a:pPr lvl="1"/>
+            <a:endParaRPr lang="fr-FR" dirty="0" smtClean="0"/>
+          </a:p>
+          <a:p>
+            <a:pPr marL="285750" indent="-285750">
+              <a:buFont typeface="Arial" panose="020B0604020202020204" pitchFamily="34" charset="0"/>
+              <a:buChar char="•"/>
+            </a:pPr>
+            <a:r>
+              <a:rPr lang="fr-FR" dirty="0" smtClean="0"/>
+              <a:t>Module de la dynamique du rotor</a:t>
+            </a:r>
+          </a:p>
+          <a:p>
+            <a:pPr marL="742950" lvl="1" indent="-285750">
+              <a:buFontTx/>
+              <a:buChar char="-"/>
+            </a:pPr>
+            <a:r>
+              <a:rPr lang="fr-FR" dirty="0" smtClean="0"/>
+              <a:t>Modèle du rotor à 4 </a:t>
+            </a:r>
+            <a:r>
+              <a:rPr lang="fr-FR" dirty="0" err="1" smtClean="0"/>
+              <a:t>ddl</a:t>
+            </a:r>
+            <a:r>
+              <a:rPr lang="fr-FR" dirty="0" smtClean="0"/>
+              <a:t> et à </a:t>
+            </a:r>
+            <a:r>
+              <a:rPr lang="fr-FR" dirty="0" err="1" smtClean="0"/>
+              <a:t>nddl</a:t>
+            </a:r>
+            <a:endParaRPr lang="fr-FR" dirty="0" smtClean="0"/>
+          </a:p>
+          <a:p>
+            <a:pPr lvl="1"/>
+            <a:endParaRPr lang="fr-FR" dirty="0"/>
+          </a:p>
+          <a:p>
+            <a:pPr marL="285750" indent="-285750">
+              <a:buFont typeface="Arial" panose="020B0604020202020204" pitchFamily="34" charset="0"/>
+              <a:buChar char="•"/>
+            </a:pPr>
+            <a:r>
+              <a:rPr lang="fr-FR" dirty="0" smtClean="0"/>
+              <a:t>Module du palier hydrodynamique</a:t>
+            </a:r>
+          </a:p>
+          <a:p>
+            <a:pPr marL="742950" lvl="1" indent="-285750">
+              <a:buFontTx/>
+              <a:buChar char="-"/>
+            </a:pPr>
+            <a:r>
+              <a:rPr lang="fr-FR" dirty="0" smtClean="0"/>
+              <a:t>Méthode de collocation aux points de </a:t>
+            </a:r>
+            <a:r>
+              <a:rPr lang="fr-FR" dirty="0" err="1" smtClean="0"/>
+              <a:t>Lobbato</a:t>
+            </a:r>
+            <a:endParaRPr lang="fr-FR" dirty="0" smtClean="0"/>
+          </a:p>
+          <a:p>
+            <a:pPr marL="742950" lvl="1" indent="-285750">
+              <a:buFontTx/>
+              <a:buChar char="-"/>
+            </a:pPr>
+            <a:r>
+              <a:rPr lang="fr-FR" dirty="0" smtClean="0"/>
+              <a:t>Modèle de cavitation</a:t>
+            </a:r>
+          </a:p>
+          <a:p>
+            <a:pPr marL="742950" lvl="1" indent="-285750">
+              <a:buFontTx/>
+              <a:buChar char="-"/>
+            </a:pPr>
+            <a:r>
+              <a:rPr lang="fr-FR" dirty="0" smtClean="0"/>
+              <a:t>Validation du module palier avec l’expérimentation</a:t>
+            </a:r>
+          </a:p>
+          <a:p>
+            <a:pPr marL="742950" lvl="1" indent="-285750">
+              <a:buFontTx/>
+              <a:buChar char="-"/>
+            </a:pPr>
+            <a:endParaRPr lang="fr-FR" dirty="0" smtClean="0"/>
+          </a:p>
+          <a:p>
+            <a:pPr marL="285750" indent="-285750">
+              <a:buFont typeface="Arial" panose="020B0604020202020204" pitchFamily="34" charset="0"/>
+              <a:buChar char="•"/>
+            </a:pPr>
+            <a:r>
+              <a:rPr lang="fr-FR" dirty="0" smtClean="0"/>
+              <a:t>Couplage de ces trois modules</a:t>
+            </a:r>
+          </a:p>
+          <a:p>
+            <a:pPr marL="742950" lvl="1" indent="-285750">
+              <a:buFontTx/>
+              <a:buChar char="-"/>
+            </a:pPr>
+            <a:r>
+              <a:rPr lang="fr-FR" dirty="0"/>
+              <a:t>Approche du flux moyen dans le temps (homogénéiser les échelles du temps)</a:t>
+            </a:r>
+          </a:p>
+          <a:p>
+            <a:pPr marL="742950" lvl="1" indent="-285750">
+              <a:buFontTx/>
+              <a:buChar char="-"/>
+            </a:pPr>
+            <a:r>
+              <a:rPr lang="fr-FR" dirty="0"/>
+              <a:t>Algorithme en régime transitoire de l’effet </a:t>
+            </a:r>
+            <a:r>
+              <a:rPr lang="fr-FR" dirty="0" smtClean="0"/>
+              <a:t>Morton</a:t>
+            </a:r>
+          </a:p>
+          <a:p>
+            <a:pPr marL="742950" lvl="1" indent="-285750">
+              <a:buFontTx/>
+              <a:buChar char="-"/>
+            </a:pPr>
+            <a:endParaRPr lang="fr-FR" dirty="0" smtClean="0"/>
+          </a:p>
+          <a:p>
+            <a:pPr marL="285750" indent="-285750">
+              <a:buFont typeface="Arial" panose="020B0604020202020204" pitchFamily="34" charset="0"/>
+              <a:buChar char="•"/>
+            </a:pPr>
+            <a:r>
+              <a:rPr lang="fr-FR" dirty="0" smtClean="0"/>
+              <a:t>Validation par la confrontation </a:t>
+            </a:r>
+            <a:r>
+              <a:rPr lang="fr-FR" dirty="0" err="1" smtClean="0"/>
+              <a:t>num</a:t>
+            </a:r>
+            <a:r>
+              <a:rPr lang="fr-FR" dirty="0" smtClean="0"/>
+              <a:t>/</a:t>
+            </a:r>
+            <a:r>
+              <a:rPr lang="fr-FR" dirty="0" err="1" smtClean="0"/>
+              <a:t>exp</a:t>
+            </a:r>
+            <a:r>
+              <a:rPr lang="fr-FR" dirty="0" smtClean="0"/>
+              <a:t> sur le rotor court 430mm</a:t>
+            </a:r>
+          </a:p>
+          <a:p>
+            <a:pPr lvl="1"/>
+            <a:r>
+              <a:rPr lang="fr-FR" dirty="0" smtClean="0"/>
+              <a:t>- Présentation des résultats numériques ( Niveau des vibrations synchrones, Différence de la température au rotor etc… )</a:t>
+            </a:r>
+          </a:p>
+          <a:p>
+            <a:pPr lvl="1"/>
+            <a:endParaRPr lang="fr-FR" dirty="0"/>
+          </a:p>
+        </p:txBody>
+      </p:sp>
+    </p:spTree>
+    <p:extLst>
+      <p:ext uri="{BB962C8B-B14F-4D97-AF65-F5344CB8AC3E}">
+        <p14:creationId xmlns:p14="http://schemas.microsoft.com/office/powerpoint/2010/main" val="91643197"/>
+      </p:ext>
+    </p:extLst>
+  </p:cSld>
+  <p:clrMapOvr>
+    <a:masterClrMapping/>
+  </p:clrMapOvr>
+</p:sld>
+</file>
+
+<file path=ppt/slides/slide5.xml><?xml version="1.0" encoding="utf-8"?>
+<p:sld xmlns:a="http://schemas.openxmlformats.org/drawingml/2006/main" xmlns:r="http://schemas.openxmlformats.org/officeDocument/2006/relationships" xmlns:p="http://schemas.openxmlformats.org/presentationml/2006/main">
+  <p:cSld>
+    <p:spTree>
+      <p:nvGrpSpPr>
+        <p:cNvPr id="1" name=""/>
+        <p:cNvGrpSpPr/>
+        <p:nvPr/>
+      </p:nvGrpSpPr>
+      <p:grpSpPr>
+        <a:xfrm>
+          <a:off x="0" y="0"/>
+          <a:ext cx="0" cy="0"/>
+          <a:chOff x="0" y="0"/>
+          <a:chExt cx="0" cy="0"/>
+        </a:xfrm>
+      </p:grpSpPr>
+      <p:sp>
+        <p:nvSpPr>
+          <p:cNvPr id="4" name="Rectangle 3"/>
+          <p:cNvSpPr/>
+          <p:nvPr/>
+        </p:nvSpPr>
+        <p:spPr>
+          <a:xfrm>
+            <a:off x="632705" y="429215"/>
+            <a:ext cx="3980192" cy="400110"/>
+          </a:xfrm>
+          <a:prstGeom prst="rect">
+            <a:avLst/>
+          </a:prstGeom>
+        </p:spPr>
+        <p:txBody>
+          <a:bodyPr wrap="none">
+            <a:spAutoFit/>
+          </a:bodyPr>
+          <a:lstStyle/>
+          <a:p>
+            <a:r>
+              <a:rPr lang="fr-FR" sz="2000" b="1" dirty="0" smtClean="0"/>
+              <a:t>Analyse de l’effet Morton ( 5 </a:t>
+            </a:r>
+            <a:r>
+              <a:rPr lang="fr-FR" sz="2000" b="1" dirty="0" err="1" smtClean="0"/>
+              <a:t>mins</a:t>
+            </a:r>
+            <a:r>
+              <a:rPr lang="fr-FR" sz="2000" b="1" dirty="0" smtClean="0"/>
+              <a:t> ) </a:t>
+            </a:r>
+            <a:endParaRPr lang="fr-FR" sz="2000" b="1" dirty="0"/>
+          </a:p>
+        </p:txBody>
+      </p:sp>
+      <p:sp>
+        <p:nvSpPr>
+          <p:cNvPr id="11" name="ZoneTexte 10"/>
+          <p:cNvSpPr txBox="1"/>
+          <p:nvPr/>
+        </p:nvSpPr>
+        <p:spPr>
+          <a:xfrm>
+            <a:off x="632705" y="829325"/>
+            <a:ext cx="9174823" cy="646331"/>
+          </a:xfrm>
+          <a:prstGeom prst="rect">
+            <a:avLst/>
+          </a:prstGeom>
+          <a:noFill/>
+        </p:spPr>
+        <p:txBody>
+          <a:bodyPr wrap="square" rtlCol="0">
+            <a:spAutoFit/>
+          </a:bodyPr>
+          <a:lstStyle/>
+          <a:p>
+            <a:pPr marL="285750" indent="-285750">
+              <a:buFont typeface="Arial" panose="020B0604020202020204" pitchFamily="34" charset="0"/>
+              <a:buChar char="•"/>
+            </a:pPr>
+            <a:r>
+              <a:rPr lang="fr-FR" dirty="0" smtClean="0"/>
+              <a:t>Méthode de l’analyse de la stabilité de l’effet Morton ( ABC )</a:t>
+            </a:r>
+          </a:p>
+          <a:p>
+            <a:pPr marL="285750" indent="-285750">
+              <a:buFont typeface="Arial" panose="020B0604020202020204" pitchFamily="34" charset="0"/>
+              <a:buChar char="•"/>
+            </a:pPr>
+            <a:r>
+              <a:rPr lang="fr-FR" dirty="0" smtClean="0"/>
+              <a:t>Cas d’application du rotor court</a:t>
+            </a:r>
+          </a:p>
+        </p:txBody>
+      </p:sp>
+      <p:sp>
+        <p:nvSpPr>
+          <p:cNvPr id="2" name="Rectangle 1"/>
+          <p:cNvSpPr/>
+          <p:nvPr/>
+        </p:nvSpPr>
+        <p:spPr>
+          <a:xfrm>
+            <a:off x="632705" y="2278563"/>
+            <a:ext cx="7601120" cy="1200329"/>
+          </a:xfrm>
+          <a:prstGeom prst="rect">
+            <a:avLst/>
+          </a:prstGeom>
+        </p:spPr>
+        <p:txBody>
+          <a:bodyPr wrap="none">
+            <a:spAutoFit/>
+          </a:bodyPr>
+          <a:lstStyle/>
+          <a:p>
+            <a:r>
+              <a:rPr lang="fr-FR" b="1" dirty="0"/>
+              <a:t>Mise en évidence de l’effet Morton (rotor flexible</a:t>
+            </a:r>
+            <a:r>
+              <a:rPr lang="fr-FR" b="1" dirty="0" smtClean="0"/>
+              <a:t>) (3 </a:t>
+            </a:r>
+            <a:r>
+              <a:rPr lang="fr-FR" b="1" dirty="0" err="1" smtClean="0"/>
+              <a:t>mins</a:t>
+            </a:r>
+            <a:r>
+              <a:rPr lang="fr-FR" b="1" dirty="0" smtClean="0"/>
+              <a:t>)</a:t>
+            </a:r>
+          </a:p>
+          <a:p>
+            <a:pPr marL="285750" indent="-285750">
+              <a:buFont typeface="Arial" panose="020B0604020202020204" pitchFamily="34" charset="0"/>
+              <a:buChar char="•"/>
+            </a:pPr>
+            <a:r>
+              <a:rPr lang="fr-FR" dirty="0"/>
+              <a:t>Nouvelle configuration du rotor proposée pour déclencher l’effet </a:t>
+            </a:r>
+            <a:r>
+              <a:rPr lang="fr-FR" dirty="0" smtClean="0"/>
+              <a:t>Morton</a:t>
+            </a:r>
+          </a:p>
+          <a:p>
+            <a:pPr marL="285750" indent="-285750">
+              <a:buFont typeface="Arial" panose="020B0604020202020204" pitchFamily="34" charset="0"/>
+              <a:buChar char="•"/>
+            </a:pPr>
+            <a:r>
+              <a:rPr lang="fr-FR" dirty="0" smtClean="0"/>
+              <a:t>Résultats numériques du rotor long flexible</a:t>
+            </a:r>
+          </a:p>
+          <a:p>
+            <a:pPr marL="285750" indent="-285750">
+              <a:buFont typeface="Arial" panose="020B0604020202020204" pitchFamily="34" charset="0"/>
+              <a:buChar char="•"/>
+            </a:pPr>
+            <a:r>
+              <a:rPr lang="fr-FR" dirty="0" smtClean="0"/>
+              <a:t>Extrait des résultats expérimentaux (citer </a:t>
+            </a:r>
+            <a:r>
+              <a:rPr lang="fr-FR" smtClean="0"/>
+              <a:t>et préciser </a:t>
+            </a:r>
+            <a:r>
+              <a:rPr lang="fr-FR" dirty="0" smtClean="0"/>
+              <a:t>les travaux de Thibaud)</a:t>
+            </a:r>
+            <a:endParaRPr lang="fr-FR" dirty="0"/>
+          </a:p>
+        </p:txBody>
+      </p:sp>
+      <p:sp>
+        <p:nvSpPr>
+          <p:cNvPr id="5" name="Rectangle 4"/>
+          <p:cNvSpPr/>
+          <p:nvPr/>
+        </p:nvSpPr>
+        <p:spPr>
+          <a:xfrm>
+            <a:off x="632705" y="4177416"/>
+            <a:ext cx="8612742" cy="1200329"/>
+          </a:xfrm>
+          <a:prstGeom prst="rect">
+            <a:avLst/>
+          </a:prstGeom>
+        </p:spPr>
+        <p:txBody>
+          <a:bodyPr wrap="none">
+            <a:spAutoFit/>
+          </a:bodyPr>
+          <a:lstStyle/>
+          <a:p>
+            <a:r>
+              <a:rPr lang="fr-FR" b="1" dirty="0" smtClean="0"/>
+              <a:t>Conclusion/ perspectives (2 </a:t>
+            </a:r>
+            <a:r>
+              <a:rPr lang="fr-FR" b="1" dirty="0" err="1" smtClean="0"/>
+              <a:t>mins</a:t>
+            </a:r>
+            <a:r>
+              <a:rPr lang="fr-FR" b="1" dirty="0" smtClean="0"/>
+              <a:t>)</a:t>
+            </a:r>
+          </a:p>
+          <a:p>
+            <a:pPr marL="285750" indent="-285750">
+              <a:buFont typeface="Arial" panose="020B0604020202020204" pitchFamily="34" charset="0"/>
+              <a:buChar char="•"/>
+            </a:pPr>
+            <a:r>
+              <a:rPr lang="fr-FR" dirty="0" smtClean="0"/>
+              <a:t>Piste et solution pour éviter l’effet Morton instable</a:t>
+            </a:r>
+          </a:p>
+          <a:p>
+            <a:pPr marL="285750" indent="-285750">
+              <a:buFont typeface="Arial" panose="020B0604020202020204" pitchFamily="34" charset="0"/>
+              <a:buChar char="•"/>
+            </a:pPr>
+            <a:r>
+              <a:rPr lang="fr-FR" dirty="0" smtClean="0"/>
+              <a:t>Confortation du modèle de l’effet Morton en utilisant les paliers à patins oscillant, etc..</a:t>
+            </a:r>
+          </a:p>
+          <a:p>
+            <a:pPr marL="285750" indent="-285750">
+              <a:buFont typeface="Arial" panose="020B0604020202020204" pitchFamily="34" charset="0"/>
+              <a:buChar char="•"/>
+            </a:pPr>
+            <a:r>
+              <a:rPr lang="fr-FR" dirty="0" smtClean="0"/>
+              <a:t>Contribution pendant ces trois ans (congrès, articles publié et à publier, session poster)</a:t>
+            </a:r>
+          </a:p>
+        </p:txBody>
+      </p:sp>
+    </p:spTree>
+    <p:extLst>
+      <p:ext uri="{BB962C8B-B14F-4D97-AF65-F5344CB8AC3E}">
+        <p14:creationId xmlns:p14="http://schemas.microsoft.com/office/powerpoint/2010/main" val="1562946490"/>
       </p:ext>
     </p:extLst>
   </p:cSld>

</xml_diff>

<commit_message>
slides de soutenance V0.1
</commit_message>
<xml_diff>
--- a/Plan de soutenance These Morton Silun.pptx
+++ b/Plan de soutenance These Morton Silun.pptx
@@ -2998,7 +2998,11 @@
             <a:pPr algn="ctr"/>
             <a:r>
               <a:rPr lang="fr-FR" sz="2400" dirty="0" smtClean="0"/>
-              <a:t>Soutenance de thèse:</a:t>
+              <a:t>Plan de soutenance </a:t>
+            </a:r>
+            <a:r>
+              <a:rPr lang="fr-FR" sz="2400" dirty="0" smtClean="0"/>
+              <a:t>de thèse:</a:t>
             </a:r>
           </a:p>
           <a:p>
@@ -3073,16 +3077,13 @@
           <a:p>
             <a:r>
               <a:rPr lang="fr-FR" sz="2400" dirty="0" smtClean="0"/>
-              <a:t>Plan</a:t>
+              <a:t>Plan </a:t>
             </a:r>
             <a:r>
               <a:rPr lang="fr-FR" sz="2400" dirty="0" smtClean="0"/>
-              <a:t> </a:t>
-            </a:r>
-            <a:r>
-              <a:rPr lang="fr-FR" sz="2400" dirty="0" smtClean="0"/>
-              <a:t>de soutenance :</a:t>
-            </a:r>
+              <a:t>:</a:t>
+            </a:r>
+            <a:endParaRPr lang="fr-FR" sz="2400" dirty="0" smtClean="0"/>
           </a:p>
           <a:p>
             <a:endParaRPr lang="fr-FR" sz="2400" dirty="0" smtClean="0"/>
@@ -3096,7 +3097,6 @@
               <a:rPr lang="fr-FR" sz="2400" b="1" dirty="0" smtClean="0"/>
               <a:t>Contexte</a:t>
             </a:r>
-            <a:endParaRPr lang="fr-FR" sz="2400" b="1" dirty="0" smtClean="0"/>
           </a:p>
           <a:p>
             <a:endParaRPr lang="fr-FR" sz="2400" dirty="0" smtClean="0"/>
@@ -3116,13 +3116,8 @@
             </a:r>
             <a:r>
               <a:rPr lang="fr-FR" sz="2400" b="1" dirty="0" smtClean="0"/>
-              <a:t>de modélisation </a:t>
-            </a:r>
-            <a:r>
-              <a:rPr lang="fr-FR" sz="2400" b="1" dirty="0" smtClean="0"/>
-              <a:t>numériques</a:t>
-            </a:r>
-            <a:endParaRPr lang="fr-FR" sz="2400" b="1" dirty="0" smtClean="0"/>
+              <a:t>de modélisation numériques</a:t>
+            </a:r>
           </a:p>
           <a:p>
             <a:endParaRPr lang="fr-FR" sz="2400" dirty="0" smtClean="0"/>
@@ -3136,7 +3131,6 @@
               <a:rPr lang="fr-FR" sz="2400" b="1" dirty="0" smtClean="0"/>
               <a:t>Modèle de l’effet Morton et sa validation </a:t>
             </a:r>
-            <a:endParaRPr lang="fr-FR" sz="2400" b="1" dirty="0" smtClean="0"/>
           </a:p>
           <a:p>
             <a:endParaRPr lang="fr-FR" sz="2400" dirty="0"/>
@@ -3148,11 +3142,7 @@
             </a:pPr>
             <a:r>
               <a:rPr lang="fr-FR" sz="2400" b="1" dirty="0" smtClean="0"/>
-              <a:t>Analyse de la stabilité de l’effet </a:t>
-            </a:r>
-            <a:r>
-              <a:rPr lang="fr-FR" sz="2400" b="1" dirty="0" smtClean="0"/>
-              <a:t>Morton</a:t>
+              <a:t>Analyse de la stabilité de l’effet Morton</a:t>
             </a:r>
           </a:p>
           <a:p>
@@ -3171,7 +3161,6 @@
               <a:rPr lang="fr-FR" sz="2400" b="1" dirty="0" smtClean="0"/>
               <a:t>Mise en évidence de l’effet Morton (rotor flexible)</a:t>
             </a:r>
-            <a:endParaRPr lang="fr-FR" sz="2400" b="1" dirty="0" smtClean="0"/>
           </a:p>
           <a:p>
             <a:endParaRPr lang="fr-FR" sz="2400" dirty="0" smtClean="0"/>

</xml_diff>